<commit_message>
add page number component
</commit_message>
<xml_diff>
--- a/SamplePresentationCanBeDeleted.pptx
+++ b/SamplePresentationCanBeDeleted.pptx
@@ -1189,6 +1189,45 @@
               <a:t>Text Text Text</a:t>
             </a:r>
             <a:endParaRPr lang="en-US" sz="1200" dirty="0"/>
+          </a:p>
+        </p:txBody>
+      </p:sp>
+      <p:sp>
+        <p:nvSpPr>
+          <p:cNvPr id="5" name="Text 3"/>
+          <p:cNvSpPr/>
+          <p:nvPr/>
+        </p:nvSpPr>
+        <p:spPr>
+          <a:xfrm>
+            <a:off x="8820000" y="4860000"/>
+            <a:ext cx="216000" cy="216000"/>
+          </a:xfrm>
+          <a:prstGeom prst="rect">
+            <a:avLst/>
+          </a:prstGeom>
+          <a:noFill/>
+          <a:ln/>
+        </p:spPr>
+        <p:txBody>
+          <a:bodyPr wrap="square" rtlCol="0" anchor="ctr"/>
+          <a:lstStyle/>
+          <a:p>
+            <a:pPr algn="ctr" indent="0" marL="0">
+              <a:buNone/>
+            </a:pPr>
+            <a:r>
+              <a:rPr lang="en-US" sz="800" dirty="0">
+                <a:solidFill>
+                  <a:srgbClr val="D9D9D9"/>
+                </a:solidFill>
+                <a:latin typeface="Roboto" pitchFamily="34" charset="0"/>
+                <a:ea typeface="Roboto" pitchFamily="34" charset="-122"/>
+                <a:cs typeface="Roboto" pitchFamily="34" charset="-120"/>
+              </a:rPr>
+              <a:t>1</a:t>
+            </a:r>
+            <a:endParaRPr lang="en-US" sz="800" dirty="0"/>
           </a:p>
         </p:txBody>
       </p:sp>

</xml_diff>